<commit_message>
Ready to be delivered
</commit_message>
<xml_diff>
--- a/Project2/docs/Ball Sort Puzzle.pptx
+++ b/Project2/docs/Ball Sort Puzzle.pptx
@@ -269,7 +269,7 @@
           <a:p>
             <a:fld id="{2B03390F-521F-40ED-9D3B-4287339B36CD}" type="datetimeFigureOut">
               <a:rPr lang="pt-PT" smtClean="0"/>
-              <a:t>25/05/2021</a:t>
+              <a:t>26/05/2021</a:t>
             </a:fld>
             <a:endParaRPr lang="pt-PT"/>
           </a:p>
@@ -467,7 +467,7 @@
           <a:p>
             <a:fld id="{2B03390F-521F-40ED-9D3B-4287339B36CD}" type="datetimeFigureOut">
               <a:rPr lang="pt-PT" smtClean="0"/>
-              <a:t>25/05/2021</a:t>
+              <a:t>26/05/2021</a:t>
             </a:fld>
             <a:endParaRPr lang="pt-PT"/>
           </a:p>
@@ -675,7 +675,7 @@
           <a:p>
             <a:fld id="{2B03390F-521F-40ED-9D3B-4287339B36CD}" type="datetimeFigureOut">
               <a:rPr lang="pt-PT" smtClean="0"/>
-              <a:t>25/05/2021</a:t>
+              <a:t>26/05/2021</a:t>
             </a:fld>
             <a:endParaRPr lang="pt-PT"/>
           </a:p>
@@ -873,7 +873,7 @@
           <a:p>
             <a:fld id="{2B03390F-521F-40ED-9D3B-4287339B36CD}" type="datetimeFigureOut">
               <a:rPr lang="pt-PT" smtClean="0"/>
-              <a:t>25/05/2021</a:t>
+              <a:t>26/05/2021</a:t>
             </a:fld>
             <a:endParaRPr lang="pt-PT"/>
           </a:p>
@@ -1148,7 +1148,7 @@
           <a:p>
             <a:fld id="{2B03390F-521F-40ED-9D3B-4287339B36CD}" type="datetimeFigureOut">
               <a:rPr lang="pt-PT" smtClean="0"/>
-              <a:t>25/05/2021</a:t>
+              <a:t>26/05/2021</a:t>
             </a:fld>
             <a:endParaRPr lang="pt-PT"/>
           </a:p>
@@ -1413,7 +1413,7 @@
           <a:p>
             <a:fld id="{2B03390F-521F-40ED-9D3B-4287339B36CD}" type="datetimeFigureOut">
               <a:rPr lang="pt-PT" smtClean="0"/>
-              <a:t>25/05/2021</a:t>
+              <a:t>26/05/2021</a:t>
             </a:fld>
             <a:endParaRPr lang="pt-PT"/>
           </a:p>
@@ -1830,7 +1830,7 @@
           <a:p>
             <a:fld id="{2B03390F-521F-40ED-9D3B-4287339B36CD}" type="datetimeFigureOut">
               <a:rPr lang="pt-PT" smtClean="0"/>
-              <a:t>25/05/2021</a:t>
+              <a:t>26/05/2021</a:t>
             </a:fld>
             <a:endParaRPr lang="pt-PT"/>
           </a:p>
@@ -1976,7 +1976,7 @@
           <a:p>
             <a:fld id="{2B03390F-521F-40ED-9D3B-4287339B36CD}" type="datetimeFigureOut">
               <a:rPr lang="pt-PT" smtClean="0"/>
-              <a:t>25/05/2021</a:t>
+              <a:t>26/05/2021</a:t>
             </a:fld>
             <a:endParaRPr lang="pt-PT"/>
           </a:p>
@@ -2089,7 +2089,7 @@
           <a:p>
             <a:fld id="{2B03390F-521F-40ED-9D3B-4287339B36CD}" type="datetimeFigureOut">
               <a:rPr lang="pt-PT" smtClean="0"/>
-              <a:t>25/05/2021</a:t>
+              <a:t>26/05/2021</a:t>
             </a:fld>
             <a:endParaRPr lang="pt-PT"/>
           </a:p>
@@ -2400,7 +2400,7 @@
           <a:p>
             <a:fld id="{2B03390F-521F-40ED-9D3B-4287339B36CD}" type="datetimeFigureOut">
               <a:rPr lang="pt-PT" smtClean="0"/>
-              <a:t>25/05/2021</a:t>
+              <a:t>26/05/2021</a:t>
             </a:fld>
             <a:endParaRPr lang="pt-PT"/>
           </a:p>
@@ -2693,7 +2693,7 @@
           <a:p>
             <a:fld id="{2B03390F-521F-40ED-9D3B-4287339B36CD}" type="datetimeFigureOut">
               <a:rPr lang="pt-PT" smtClean="0"/>
-              <a:t>25/05/2021</a:t>
+              <a:t>26/05/2021</a:t>
             </a:fld>
             <a:endParaRPr lang="pt-PT"/>
           </a:p>
@@ -2934,7 +2934,7 @@
           <a:p>
             <a:fld id="{2B03390F-521F-40ED-9D3B-4287339B36CD}" type="datetimeFigureOut">
               <a:rPr lang="pt-PT" smtClean="0"/>
-              <a:t>25/05/2021</a:t>
+              <a:t>26/05/2021</a:t>
             </a:fld>
             <a:endParaRPr lang="pt-PT"/>
           </a:p>

</xml_diff>